<commit_message>
font modification, final slides
</commit_message>
<xml_diff>
--- a/Presentation.pptx
+++ b/Presentation.pptx
@@ -4625,7 +4625,7 @@
                 </a:solidFill>
                 <a:latin typeface="Script MT Bold" panose="03040602040607080904" pitchFamily="66" charset="0"/>
               </a:rPr>
-              <a:t>Tap’n</a:t>
+              <a:t>Tap’N</a:t>
             </a:r>
             <a:r>
               <a:rPr lang="en-US" altLang="ko-KR" sz="4000" dirty="0" smtClean="0">
@@ -4634,7 +4634,16 @@
                 </a:solidFill>
                 <a:latin typeface="Script MT Bold" panose="03040602040607080904" pitchFamily="66" charset="0"/>
               </a:rPr>
-              <a:t> Cook</a:t>
+              <a:t> </a:t>
+            </a:r>
+            <a:r>
+              <a:rPr lang="en-US" altLang="ko-KR" sz="4000" dirty="0" smtClean="0">
+                <a:solidFill>
+                  <a:schemeClr val="bg1"/>
+                </a:solidFill>
+                <a:latin typeface="Script MT Bold" panose="03040602040607080904" pitchFamily="66" charset="0"/>
+              </a:rPr>
+              <a:t>Cook</a:t>
             </a:r>
             <a:endParaRPr lang="ko-KR" altLang="en-US" sz="4800" dirty="0">
               <a:solidFill>

</xml_diff>